<commit_message>
More complex PoC and a simplistic PoC with button visibility
</commit_message>
<xml_diff>
--- a/clickjacking/presentation.pptx
+++ b/clickjacking/presentation.pptx
@@ -1,11 +1,11 @@
 
 <file path=ppt/presentation.xml><?xml version="1.0" encoding="utf-8"?>
-<p:presentation xmlns:a="http://schemas.openxmlformats.org/drawingml/2006/main" xmlns:r="http://schemas.openxmlformats.org/officeDocument/2006/relationships" xmlns:p="http://schemas.openxmlformats.org/presentationml/2006/main" showSpecialPlsOnTitleSld="0" autoCompressPictures="0">
+<p:presentation xmlns:a="http://schemas.openxmlformats.org/drawingml/2006/main" xmlns:r="http://schemas.openxmlformats.org/officeDocument/2006/relationships" xmlns:p="http://schemas.openxmlformats.org/presentationml/2006/main" showSpecialPlsOnTitleSld="0" saveSubsetFonts="1" autoCompressPictures="0">
   <p:sldMasterIdLst>
     <p:sldMasterId id="2147483648" r:id="rId1"/>
   </p:sldMasterIdLst>
   <p:notesMasterIdLst>
-    <p:notesMasterId r:id="rId12"/>
+    <p:notesMasterId r:id="rId13"/>
   </p:notesMasterIdLst>
   <p:sldIdLst>
     <p:sldId id="256" r:id="rId2"/>
@@ -17,7 +17,8 @@
     <p:sldId id="262" r:id="rId8"/>
     <p:sldId id="263" r:id="rId9"/>
     <p:sldId id="264" r:id="rId10"/>
-    <p:sldId id="265" r:id="rId11"/>
+    <p:sldId id="266" r:id="rId11"/>
+    <p:sldId id="265" r:id="rId12"/>
   </p:sldIdLst>
   <p:sldSz cx="12192000" cy="6858000"/>
   <p:notesSz cx="6858000" cy="9144000"/>
@@ -206,7 +207,7 @@
           <a:p>
             <a:fld id="{5B3E189C-1530-4F7A-B894-424BE09E43BE}" type="datetimeFigureOut">
               <a:rPr lang="en-US" smtClean="0"/>
-              <a:t>2/6/2017</a:t>
+              <a:t>2/9/17</a:t>
             </a:fld>
             <a:endParaRPr lang="en-US"/>
           </a:p>
@@ -530,7 +531,7 @@
           <a:noFill/>
           <a:extLst>
             <a:ext uri="{909E8E84-426E-40dd-AFC4-6F175D3DCCD1}">
-              <a14:hiddenFill xmlns:a14="http://schemas.microsoft.com/office/drawing/2010/main" xmlns="">
+              <a14:hiddenFill xmlns="" xmlns:a14="http://schemas.microsoft.com/office/drawing/2010/main">
                 <a:solidFill>
                   <a:srgbClr val="FFFFFF"/>
                 </a:solidFill>
@@ -589,7 +590,7 @@
             </a:ln>
             <a:extLst>
               <a:ext uri="{91240B29-F687-4f45-9708-019B960494DF}">
-                <a14:hiddenLine xmlns:a14="http://schemas.microsoft.com/office/drawing/2010/main" xmlns="" w="9525">
+                <a14:hiddenLine xmlns="" xmlns:a14="http://schemas.microsoft.com/office/drawing/2010/main" w="9525">
                   <a:solidFill>
                     <a:srgbClr val="000000"/>
                   </a:solidFill>
@@ -679,7 +680,7 @@
             </a:ln>
             <a:extLst>
               <a:ext uri="{91240B29-F687-4f45-9708-019B960494DF}">
-                <a14:hiddenLine xmlns:a14="http://schemas.microsoft.com/office/drawing/2010/main" xmlns="" w="9525">
+                <a14:hiddenLine xmlns="" xmlns:a14="http://schemas.microsoft.com/office/drawing/2010/main" w="9525">
                   <a:solidFill>
                     <a:srgbClr val="000000"/>
                   </a:solidFill>
@@ -769,7 +770,7 @@
             </a:ln>
             <a:extLst>
               <a:ext uri="{91240B29-F687-4f45-9708-019B960494DF}">
-                <a14:hiddenLine xmlns:a14="http://schemas.microsoft.com/office/drawing/2010/main" xmlns="" w="9525">
+                <a14:hiddenLine xmlns="" xmlns:a14="http://schemas.microsoft.com/office/drawing/2010/main" w="9525">
                   <a:solidFill>
                     <a:srgbClr val="000000"/>
                   </a:solidFill>
@@ -803,7 +804,7 @@
             </a:ln>
             <a:extLst>
               <a:ext uri="{91240B29-F687-4f45-9708-019B960494DF}">
-                <a14:hiddenLine xmlns:a14="http://schemas.microsoft.com/office/drawing/2010/main" xmlns="" w="9525">
+                <a14:hiddenLine xmlns="" xmlns:a14="http://schemas.microsoft.com/office/drawing/2010/main" w="9525">
                   <a:solidFill>
                     <a:srgbClr val="000000"/>
                   </a:solidFill>
@@ -893,7 +894,7 @@
             </a:ln>
             <a:extLst>
               <a:ext uri="{91240B29-F687-4f45-9708-019B960494DF}">
-                <a14:hiddenLine xmlns:a14="http://schemas.microsoft.com/office/drawing/2010/main" xmlns="" w="9525">
+                <a14:hiddenLine xmlns="" xmlns:a14="http://schemas.microsoft.com/office/drawing/2010/main" w="9525">
                   <a:solidFill>
                     <a:srgbClr val="000000"/>
                   </a:solidFill>
@@ -955,7 +956,7 @@
             </a:ln>
             <a:extLst>
               <a:ext uri="{91240B29-F687-4f45-9708-019B960494DF}">
-                <a14:hiddenLine xmlns:a14="http://schemas.microsoft.com/office/drawing/2010/main" xmlns="" w="9525">
+                <a14:hiddenLine xmlns="" xmlns:a14="http://schemas.microsoft.com/office/drawing/2010/main" w="9525">
                   <a:solidFill>
                     <a:srgbClr val="000000"/>
                   </a:solidFill>
@@ -1017,7 +1018,7 @@
             </a:ln>
             <a:extLst>
               <a:ext uri="{91240B29-F687-4f45-9708-019B960494DF}">
-                <a14:hiddenLine xmlns:a14="http://schemas.microsoft.com/office/drawing/2010/main" xmlns="" w="9525">
+                <a14:hiddenLine xmlns="" xmlns:a14="http://schemas.microsoft.com/office/drawing/2010/main" w="9525">
                   <a:solidFill>
                     <a:srgbClr val="000000"/>
                   </a:solidFill>
@@ -1107,7 +1108,7 @@
             </a:ln>
             <a:extLst>
               <a:ext uri="{91240B29-F687-4f45-9708-019B960494DF}">
-                <a14:hiddenLine xmlns:a14="http://schemas.microsoft.com/office/drawing/2010/main" xmlns="" w="9525">
+                <a14:hiddenLine xmlns="" xmlns:a14="http://schemas.microsoft.com/office/drawing/2010/main" w="9525">
                   <a:solidFill>
                     <a:srgbClr val="000000"/>
                   </a:solidFill>
@@ -1169,7 +1170,7 @@
             </a:ln>
             <a:extLst>
               <a:ext uri="{91240B29-F687-4f45-9708-019B960494DF}">
-                <a14:hiddenLine xmlns:a14="http://schemas.microsoft.com/office/drawing/2010/main" xmlns="" w="9525">
+                <a14:hiddenLine xmlns="" xmlns:a14="http://schemas.microsoft.com/office/drawing/2010/main" w="9525">
                   <a:solidFill>
                     <a:srgbClr val="000000"/>
                   </a:solidFill>
@@ -1231,7 +1232,7 @@
             </a:ln>
             <a:extLst>
               <a:ext uri="{91240B29-F687-4f45-9708-019B960494DF}">
-                <a14:hiddenLine xmlns:a14="http://schemas.microsoft.com/office/drawing/2010/main" xmlns="" w="9525">
+                <a14:hiddenLine xmlns="" xmlns:a14="http://schemas.microsoft.com/office/drawing/2010/main" w="9525">
                   <a:solidFill>
                     <a:srgbClr val="000000"/>
                   </a:solidFill>
@@ -1321,7 +1322,7 @@
             </a:ln>
             <a:extLst>
               <a:ext uri="{91240B29-F687-4f45-9708-019B960494DF}">
-                <a14:hiddenLine xmlns:a14="http://schemas.microsoft.com/office/drawing/2010/main" xmlns="" w="9525">
+                <a14:hiddenLine xmlns="" xmlns:a14="http://schemas.microsoft.com/office/drawing/2010/main" w="9525">
                   <a:solidFill>
                     <a:srgbClr val="000000"/>
                   </a:solidFill>
@@ -1411,7 +1412,7 @@
             </a:ln>
             <a:extLst>
               <a:ext uri="{91240B29-F687-4f45-9708-019B960494DF}">
-                <a14:hiddenLine xmlns:a14="http://schemas.microsoft.com/office/drawing/2010/main" xmlns="" w="9525">
+                <a14:hiddenLine xmlns="" xmlns:a14="http://schemas.microsoft.com/office/drawing/2010/main" w="9525">
                   <a:solidFill>
                     <a:srgbClr val="000000"/>
                   </a:solidFill>
@@ -1473,7 +1474,7 @@
             </a:ln>
             <a:extLst>
               <a:ext uri="{91240B29-F687-4f45-9708-019B960494DF}">
-                <a14:hiddenLine xmlns:a14="http://schemas.microsoft.com/office/drawing/2010/main" xmlns="" w="9525">
+                <a14:hiddenLine xmlns="" xmlns:a14="http://schemas.microsoft.com/office/drawing/2010/main" w="9525">
                   <a:solidFill>
                     <a:srgbClr val="000000"/>
                   </a:solidFill>
@@ -1583,7 +1584,7 @@
             </a:ln>
             <a:extLst>
               <a:ext uri="{91240B29-F687-4f45-9708-019B960494DF}">
-                <a14:hiddenLine xmlns:a14="http://schemas.microsoft.com/office/drawing/2010/main" xmlns="" w="9525">
+                <a14:hiddenLine xmlns="" xmlns:a14="http://schemas.microsoft.com/office/drawing/2010/main" w="9525">
                   <a:solidFill>
                     <a:srgbClr val="000000"/>
                   </a:solidFill>
@@ -1645,7 +1646,7 @@
             </a:ln>
             <a:extLst>
               <a:ext uri="{91240B29-F687-4f45-9708-019B960494DF}">
-                <a14:hiddenLine xmlns:a14="http://schemas.microsoft.com/office/drawing/2010/main" xmlns="" w="9525">
+                <a14:hiddenLine xmlns="" xmlns:a14="http://schemas.microsoft.com/office/drawing/2010/main" w="9525">
                   <a:solidFill>
                     <a:srgbClr val="000000"/>
                   </a:solidFill>
@@ -1735,7 +1736,7 @@
             </a:ln>
             <a:extLst>
               <a:ext uri="{91240B29-F687-4f45-9708-019B960494DF}">
-                <a14:hiddenLine xmlns:a14="http://schemas.microsoft.com/office/drawing/2010/main" xmlns="" w="9525">
+                <a14:hiddenLine xmlns="" xmlns:a14="http://schemas.microsoft.com/office/drawing/2010/main" w="9525">
                   <a:solidFill>
                     <a:srgbClr val="000000"/>
                   </a:solidFill>
@@ -1825,7 +1826,7 @@
             </a:ln>
             <a:extLst>
               <a:ext uri="{91240B29-F687-4f45-9708-019B960494DF}">
-                <a14:hiddenLine xmlns:a14="http://schemas.microsoft.com/office/drawing/2010/main" xmlns="" w="9525">
+                <a14:hiddenLine xmlns="" xmlns:a14="http://schemas.microsoft.com/office/drawing/2010/main" w="9525">
                   <a:solidFill>
                     <a:srgbClr val="000000"/>
                   </a:solidFill>
@@ -1887,7 +1888,7 @@
             </a:ln>
             <a:extLst>
               <a:ext uri="{91240B29-F687-4f45-9708-019B960494DF}">
-                <a14:hiddenLine xmlns:a14="http://schemas.microsoft.com/office/drawing/2010/main" xmlns="" w="9525">
+                <a14:hiddenLine xmlns="" xmlns:a14="http://schemas.microsoft.com/office/drawing/2010/main" w="9525">
                   <a:solidFill>
                     <a:srgbClr val="000000"/>
                   </a:solidFill>
@@ -1977,7 +1978,7 @@
             </a:ln>
             <a:extLst>
               <a:ext uri="{91240B29-F687-4f45-9708-019B960494DF}">
-                <a14:hiddenLine xmlns:a14="http://schemas.microsoft.com/office/drawing/2010/main" xmlns="" w="9525">
+                <a14:hiddenLine xmlns="" xmlns:a14="http://schemas.microsoft.com/office/drawing/2010/main" w="9525">
                   <a:solidFill>
                     <a:srgbClr val="000000"/>
                   </a:solidFill>
@@ -2067,7 +2068,7 @@
             </a:ln>
             <a:extLst>
               <a:ext uri="{91240B29-F687-4f45-9708-019B960494DF}">
-                <a14:hiddenLine xmlns:a14="http://schemas.microsoft.com/office/drawing/2010/main" xmlns="" w="9525">
+                <a14:hiddenLine xmlns="" xmlns:a14="http://schemas.microsoft.com/office/drawing/2010/main" w="9525">
                   <a:solidFill>
                     <a:srgbClr val="000000"/>
                   </a:solidFill>
@@ -2123,7 +2124,7 @@
             </a:ln>
             <a:extLst>
               <a:ext uri="{91240B29-F687-4f45-9708-019B960494DF}">
-                <a14:hiddenLine xmlns:a14="http://schemas.microsoft.com/office/drawing/2010/main" xmlns="" w="9525">
+                <a14:hiddenLine xmlns="" xmlns:a14="http://schemas.microsoft.com/office/drawing/2010/main" w="9525">
                   <a:solidFill>
                     <a:srgbClr val="000000"/>
                   </a:solidFill>
@@ -2213,7 +2214,7 @@
             </a:ln>
             <a:extLst>
               <a:ext uri="{91240B29-F687-4f45-9708-019B960494DF}">
-                <a14:hiddenLine xmlns:a14="http://schemas.microsoft.com/office/drawing/2010/main" xmlns="" w="9525">
+                <a14:hiddenLine xmlns="" xmlns:a14="http://schemas.microsoft.com/office/drawing/2010/main" w="9525">
                   <a:solidFill>
                     <a:srgbClr val="000000"/>
                   </a:solidFill>
@@ -2269,7 +2270,7 @@
             </a:ln>
             <a:extLst>
               <a:ext uri="{91240B29-F687-4f45-9708-019B960494DF}">
-                <a14:hiddenLine xmlns:a14="http://schemas.microsoft.com/office/drawing/2010/main" xmlns="" w="9525">
+                <a14:hiddenLine xmlns="" xmlns:a14="http://schemas.microsoft.com/office/drawing/2010/main" w="9525">
                   <a:solidFill>
                     <a:srgbClr val="000000"/>
                   </a:solidFill>
@@ -2359,7 +2360,7 @@
             </a:ln>
             <a:extLst>
               <a:ext uri="{91240B29-F687-4f45-9708-019B960494DF}">
-                <a14:hiddenLine xmlns:a14="http://schemas.microsoft.com/office/drawing/2010/main" xmlns="" w="9525">
+                <a14:hiddenLine xmlns="" xmlns:a14="http://schemas.microsoft.com/office/drawing/2010/main" w="9525">
                   <a:solidFill>
                     <a:srgbClr val="000000"/>
                   </a:solidFill>
@@ -2427,7 +2428,7 @@
             </a:ln>
             <a:extLst>
               <a:ext uri="{91240B29-F687-4f45-9708-019B960494DF}">
-                <a14:hiddenLine xmlns:a14="http://schemas.microsoft.com/office/drawing/2010/main" xmlns="" w="9525">
+                <a14:hiddenLine xmlns="" xmlns:a14="http://schemas.microsoft.com/office/drawing/2010/main" w="9525">
                   <a:solidFill>
                     <a:srgbClr val="000000"/>
                   </a:solidFill>
@@ -2517,7 +2518,7 @@
             </a:ln>
             <a:extLst>
               <a:ext uri="{91240B29-F687-4f45-9708-019B960494DF}">
-                <a14:hiddenLine xmlns:a14="http://schemas.microsoft.com/office/drawing/2010/main" xmlns="" w="9525">
+                <a14:hiddenLine xmlns="" xmlns:a14="http://schemas.microsoft.com/office/drawing/2010/main" w="9525">
                   <a:solidFill>
                     <a:srgbClr val="000000"/>
                   </a:solidFill>
@@ -2585,7 +2586,7 @@
             </a:ln>
             <a:extLst>
               <a:ext uri="{91240B29-F687-4f45-9708-019B960494DF}">
-                <a14:hiddenLine xmlns:a14="http://schemas.microsoft.com/office/drawing/2010/main" xmlns="" w="9525">
+                <a14:hiddenLine xmlns="" xmlns:a14="http://schemas.microsoft.com/office/drawing/2010/main" w="9525">
                   <a:solidFill>
                     <a:srgbClr val="000000"/>
                   </a:solidFill>
@@ -2675,7 +2676,7 @@
             </a:ln>
             <a:extLst>
               <a:ext uri="{91240B29-F687-4f45-9708-019B960494DF}">
-                <a14:hiddenLine xmlns:a14="http://schemas.microsoft.com/office/drawing/2010/main" xmlns="" w="9525">
+                <a14:hiddenLine xmlns="" xmlns:a14="http://schemas.microsoft.com/office/drawing/2010/main" w="9525">
                   <a:solidFill>
                     <a:srgbClr val="000000"/>
                   </a:solidFill>
@@ -2709,7 +2710,7 @@
             </a:ln>
             <a:extLst>
               <a:ext uri="{91240B29-F687-4f45-9708-019B960494DF}">
-                <a14:hiddenLine xmlns:a14="http://schemas.microsoft.com/office/drawing/2010/main" xmlns="" w="9525">
+                <a14:hiddenLine xmlns="" xmlns:a14="http://schemas.microsoft.com/office/drawing/2010/main" w="9525">
                   <a:solidFill>
                     <a:srgbClr val="000000"/>
                   </a:solidFill>
@@ -2799,7 +2800,7 @@
             </a:ln>
             <a:extLst>
               <a:ext uri="{91240B29-F687-4f45-9708-019B960494DF}">
-                <a14:hiddenLine xmlns:a14="http://schemas.microsoft.com/office/drawing/2010/main" xmlns="" w="9525">
+                <a14:hiddenLine xmlns="" xmlns:a14="http://schemas.microsoft.com/office/drawing/2010/main" w="9525">
                   <a:solidFill>
                     <a:srgbClr val="000000"/>
                   </a:solidFill>
@@ -2861,7 +2862,7 @@
             </a:ln>
             <a:extLst>
               <a:ext uri="{91240B29-F687-4f45-9708-019B960494DF}">
-                <a14:hiddenLine xmlns:a14="http://schemas.microsoft.com/office/drawing/2010/main" xmlns="" w="9525">
+                <a14:hiddenLine xmlns="" xmlns:a14="http://schemas.microsoft.com/office/drawing/2010/main" w="9525">
                   <a:solidFill>
                     <a:srgbClr val="000000"/>
                   </a:solidFill>
@@ -2923,7 +2924,7 @@
             </a:ln>
             <a:extLst>
               <a:ext uri="{91240B29-F687-4f45-9708-019B960494DF}">
-                <a14:hiddenLine xmlns:a14="http://schemas.microsoft.com/office/drawing/2010/main" xmlns="" w="9525">
+                <a14:hiddenLine xmlns="" xmlns:a14="http://schemas.microsoft.com/office/drawing/2010/main" w="9525">
                   <a:solidFill>
                     <a:srgbClr val="000000"/>
                   </a:solidFill>
@@ -3013,7 +3014,7 @@
             </a:ln>
             <a:extLst>
               <a:ext uri="{91240B29-F687-4f45-9708-019B960494DF}">
-                <a14:hiddenLine xmlns:a14="http://schemas.microsoft.com/office/drawing/2010/main" xmlns="" w="9525">
+                <a14:hiddenLine xmlns="" xmlns:a14="http://schemas.microsoft.com/office/drawing/2010/main" w="9525">
                   <a:solidFill>
                     <a:srgbClr val="000000"/>
                   </a:solidFill>
@@ -3081,7 +3082,7 @@
             </a:ln>
             <a:extLst>
               <a:ext uri="{91240B29-F687-4f45-9708-019B960494DF}">
-                <a14:hiddenLine xmlns:a14="http://schemas.microsoft.com/office/drawing/2010/main" xmlns="" w="9525">
+                <a14:hiddenLine xmlns="" xmlns:a14="http://schemas.microsoft.com/office/drawing/2010/main" w="9525">
                   <a:solidFill>
                     <a:srgbClr val="000000"/>
                   </a:solidFill>
@@ -3143,7 +3144,7 @@
             </a:ln>
             <a:extLst>
               <a:ext uri="{91240B29-F687-4f45-9708-019B960494DF}">
-                <a14:hiddenLine xmlns:a14="http://schemas.microsoft.com/office/drawing/2010/main" xmlns="" w="9525">
+                <a14:hiddenLine xmlns="" xmlns:a14="http://schemas.microsoft.com/office/drawing/2010/main" w="9525">
                   <a:solidFill>
                     <a:srgbClr val="000000"/>
                   </a:solidFill>
@@ -3233,7 +3234,7 @@
             </a:ln>
             <a:extLst>
               <a:ext uri="{91240B29-F687-4f45-9708-019B960494DF}">
-                <a14:hiddenLine xmlns:a14="http://schemas.microsoft.com/office/drawing/2010/main" xmlns="" w="9525">
+                <a14:hiddenLine xmlns="" xmlns:a14="http://schemas.microsoft.com/office/drawing/2010/main" w="9525">
                   <a:solidFill>
                     <a:srgbClr val="000000"/>
                   </a:solidFill>
@@ -3295,7 +3296,7 @@
             </a:ln>
             <a:extLst>
               <a:ext uri="{91240B29-F687-4f45-9708-019B960494DF}">
-                <a14:hiddenLine xmlns:a14="http://schemas.microsoft.com/office/drawing/2010/main" xmlns="" w="9525">
+                <a14:hiddenLine xmlns="" xmlns:a14="http://schemas.microsoft.com/office/drawing/2010/main" w="9525">
                   <a:solidFill>
                     <a:srgbClr val="000000"/>
                   </a:solidFill>
@@ -3385,7 +3386,7 @@
             </a:ln>
             <a:extLst>
               <a:ext uri="{91240B29-F687-4f45-9708-019B960494DF}">
-                <a14:hiddenLine xmlns:a14="http://schemas.microsoft.com/office/drawing/2010/main" xmlns="" w="9525">
+                <a14:hiddenLine xmlns="" xmlns:a14="http://schemas.microsoft.com/office/drawing/2010/main" w="9525">
                   <a:solidFill>
                     <a:srgbClr val="000000"/>
                   </a:solidFill>
@@ -3447,7 +3448,7 @@
             </a:ln>
             <a:extLst>
               <a:ext uri="{91240B29-F687-4f45-9708-019B960494DF}">
-                <a14:hiddenLine xmlns:a14="http://schemas.microsoft.com/office/drawing/2010/main" xmlns="" w="9525">
+                <a14:hiddenLine xmlns="" xmlns:a14="http://schemas.microsoft.com/office/drawing/2010/main" w="9525">
                   <a:solidFill>
                     <a:srgbClr val="000000"/>
                   </a:solidFill>
@@ -3537,7 +3538,7 @@
             </a:ln>
             <a:extLst>
               <a:ext uri="{91240B29-F687-4f45-9708-019B960494DF}">
-                <a14:hiddenLine xmlns:a14="http://schemas.microsoft.com/office/drawing/2010/main" xmlns="" w="9525">
+                <a14:hiddenLine xmlns="" xmlns:a14="http://schemas.microsoft.com/office/drawing/2010/main" w="9525">
                   <a:solidFill>
                     <a:srgbClr val="000000"/>
                   </a:solidFill>
@@ -3571,7 +3572,7 @@
             </a:ln>
             <a:extLst>
               <a:ext uri="{91240B29-F687-4f45-9708-019B960494DF}">
-                <a14:hiddenLine xmlns:a14="http://schemas.microsoft.com/office/drawing/2010/main" xmlns="" w="9525">
+                <a14:hiddenLine xmlns="" xmlns:a14="http://schemas.microsoft.com/office/drawing/2010/main" w="9525">
                   <a:solidFill>
                     <a:srgbClr val="000000"/>
                   </a:solidFill>
@@ -3636,7 +3637,7 @@
             </a:ln>
             <a:extLst>
               <a:ext uri="{91240B29-F687-4f45-9708-019B960494DF}">
-                <a14:hiddenLine xmlns:a14="http://schemas.microsoft.com/office/drawing/2010/main" xmlns="" w="9525">
+                <a14:hiddenLine xmlns="" xmlns:a14="http://schemas.microsoft.com/office/drawing/2010/main" w="9525">
                   <a:solidFill>
                     <a:srgbClr val="000000"/>
                   </a:solidFill>
@@ -3726,7 +3727,7 @@
             </a:ln>
             <a:extLst>
               <a:ext uri="{91240B29-F687-4f45-9708-019B960494DF}">
-                <a14:hiddenLine xmlns:a14="http://schemas.microsoft.com/office/drawing/2010/main" xmlns="" w="9525">
+                <a14:hiddenLine xmlns="" xmlns:a14="http://schemas.microsoft.com/office/drawing/2010/main" w="9525">
                   <a:solidFill>
                     <a:srgbClr val="000000"/>
                   </a:solidFill>
@@ -3788,7 +3789,7 @@
             </a:ln>
             <a:extLst>
               <a:ext uri="{91240B29-F687-4f45-9708-019B960494DF}">
-                <a14:hiddenLine xmlns:a14="http://schemas.microsoft.com/office/drawing/2010/main" xmlns="" w="9525">
+                <a14:hiddenLine xmlns="" xmlns:a14="http://schemas.microsoft.com/office/drawing/2010/main" w="9525">
                   <a:solidFill>
                     <a:srgbClr val="000000"/>
                   </a:solidFill>
@@ -3878,7 +3879,7 @@
             </a:ln>
             <a:extLst>
               <a:ext uri="{91240B29-F687-4f45-9708-019B960494DF}">
-                <a14:hiddenLine xmlns:a14="http://schemas.microsoft.com/office/drawing/2010/main" xmlns="" w="9525">
+                <a14:hiddenLine xmlns="" xmlns:a14="http://schemas.microsoft.com/office/drawing/2010/main" w="9525">
                   <a:solidFill>
                     <a:srgbClr val="000000"/>
                   </a:solidFill>
@@ -3968,7 +3969,7 @@
             </a:ln>
             <a:extLst>
               <a:ext uri="{91240B29-F687-4f45-9708-019B960494DF}">
-                <a14:hiddenLine xmlns:a14="http://schemas.microsoft.com/office/drawing/2010/main" xmlns="" w="9525">
+                <a14:hiddenLine xmlns="" xmlns:a14="http://schemas.microsoft.com/office/drawing/2010/main" w="9525">
                   <a:solidFill>
                     <a:srgbClr val="000000"/>
                   </a:solidFill>
@@ -4033,7 +4034,7 @@
             </a:ln>
             <a:extLst>
               <a:ext uri="{91240B29-F687-4f45-9708-019B960494DF}">
-                <a14:hiddenLine xmlns:a14="http://schemas.microsoft.com/office/drawing/2010/main" xmlns="" w="9525">
+                <a14:hiddenLine xmlns="" xmlns:a14="http://schemas.microsoft.com/office/drawing/2010/main" w="9525">
                   <a:solidFill>
                     <a:srgbClr val="000000"/>
                   </a:solidFill>
@@ -4095,7 +4096,7 @@
             </a:ln>
             <a:extLst>
               <a:ext uri="{91240B29-F687-4f45-9708-019B960494DF}">
-                <a14:hiddenLine xmlns:a14="http://schemas.microsoft.com/office/drawing/2010/main" xmlns="" w="9525">
+                <a14:hiddenLine xmlns="" xmlns:a14="http://schemas.microsoft.com/office/drawing/2010/main" w="9525">
                   <a:solidFill>
                     <a:srgbClr val="000000"/>
                   </a:solidFill>
@@ -4185,7 +4186,7 @@
             </a:ln>
             <a:extLst>
               <a:ext uri="{91240B29-F687-4f45-9708-019B960494DF}">
-                <a14:hiddenLine xmlns:a14="http://schemas.microsoft.com/office/drawing/2010/main" xmlns="" w="9525">
+                <a14:hiddenLine xmlns="" xmlns:a14="http://schemas.microsoft.com/office/drawing/2010/main" w="9525">
                   <a:solidFill>
                     <a:srgbClr val="000000"/>
                   </a:solidFill>
@@ -4275,7 +4276,7 @@
             </a:ln>
             <a:extLst>
               <a:ext uri="{91240B29-F687-4f45-9708-019B960494DF}">
-                <a14:hiddenLine xmlns:a14="http://schemas.microsoft.com/office/drawing/2010/main" xmlns="" w="9525">
+                <a14:hiddenLine xmlns="" xmlns:a14="http://schemas.microsoft.com/office/drawing/2010/main" w="9525">
                   <a:solidFill>
                     <a:srgbClr val="000000"/>
                   </a:solidFill>
@@ -4337,7 +4338,7 @@
             </a:ln>
             <a:extLst>
               <a:ext uri="{91240B29-F687-4f45-9708-019B960494DF}">
-                <a14:hiddenLine xmlns:a14="http://schemas.microsoft.com/office/drawing/2010/main" xmlns="" w="9525">
+                <a14:hiddenLine xmlns="" xmlns:a14="http://schemas.microsoft.com/office/drawing/2010/main" w="9525">
                   <a:solidFill>
                     <a:srgbClr val="000000"/>
                   </a:solidFill>
@@ -4457,7 +4458,7 @@
             </a:ln>
             <a:extLst>
               <a:ext uri="{91240B29-F687-4f45-9708-019B960494DF}">
-                <a14:hiddenLine xmlns:a14="http://schemas.microsoft.com/office/drawing/2010/main" xmlns="" w="9525">
+                <a14:hiddenLine xmlns="" xmlns:a14="http://schemas.microsoft.com/office/drawing/2010/main" w="9525">
                   <a:solidFill>
                     <a:srgbClr val="000000"/>
                   </a:solidFill>
@@ -4525,7 +4526,7 @@
             </a:ln>
             <a:extLst>
               <a:ext uri="{91240B29-F687-4f45-9708-019B960494DF}">
-                <a14:hiddenLine xmlns:a14="http://schemas.microsoft.com/office/drawing/2010/main" xmlns="" w="9525">
+                <a14:hiddenLine xmlns="" xmlns:a14="http://schemas.microsoft.com/office/drawing/2010/main" w="9525">
                   <a:solidFill>
                     <a:srgbClr val="000000"/>
                   </a:solidFill>
@@ -4615,7 +4616,7 @@
             </a:ln>
             <a:extLst>
               <a:ext uri="{91240B29-F687-4f45-9708-019B960494DF}">
-                <a14:hiddenLine xmlns:a14="http://schemas.microsoft.com/office/drawing/2010/main" xmlns="" w="9525">
+                <a14:hiddenLine xmlns="" xmlns:a14="http://schemas.microsoft.com/office/drawing/2010/main" w="9525">
                   <a:solidFill>
                     <a:srgbClr val="000000"/>
                   </a:solidFill>
@@ -4758,7 +4759,7 @@
           <a:p>
             <a:fld id="{95C6FA87-0212-44E8-88F3-5CCD0466D66D}" type="datetime1">
               <a:rPr lang="en-US" smtClean="0"/>
-              <a:t>2/6/2017</a:t>
+              <a:t>2/9/17</a:t>
             </a:fld>
             <a:endParaRPr lang="en-US" dirty="0"/>
           </a:p>
@@ -5032,7 +5033,7 @@
           <a:p>
             <a:fld id="{FF8999BF-6F0C-4EC5-A0A8-9C747402E74E}" type="datetime1">
               <a:rPr lang="en-US" smtClean="0"/>
-              <a:t>2/6/2017</a:t>
+              <a:t>2/9/17</a:t>
             </a:fld>
             <a:endParaRPr lang="en-US" dirty="0"/>
           </a:p>
@@ -5235,7 +5236,7 @@
           <a:p>
             <a:fld id="{BBA8EAC5-9B5A-4265-82F4-8DC1B2153AC6}" type="datetime1">
               <a:rPr lang="en-US" smtClean="0"/>
-              <a:t>2/6/2017</a:t>
+              <a:t>2/9/17</a:t>
             </a:fld>
             <a:endParaRPr lang="en-US" dirty="0"/>
           </a:p>
@@ -5505,7 +5506,7 @@
           <a:p>
             <a:fld id="{596087F3-DAC7-436F-BD70-ED27B4C20ED5}" type="datetime1">
               <a:rPr lang="en-US" smtClean="0"/>
-              <a:t>2/6/2017</a:t>
+              <a:t>2/9/17</a:t>
             </a:fld>
             <a:endParaRPr lang="en-US" dirty="0"/>
           </a:p>
@@ -5946,7 +5947,7 @@
           <a:p>
             <a:fld id="{DBC050CB-CD9A-4442-9978-0DBB087ED9F0}" type="datetime1">
               <a:rPr lang="en-US" smtClean="0"/>
-              <a:t>2/6/2017</a:t>
+              <a:t>2/9/17</a:t>
             </a:fld>
             <a:endParaRPr lang="en-US" dirty="0"/>
           </a:p>
@@ -6499,7 +6500,7 @@
           <a:p>
             <a:fld id="{54278396-2B1E-426F-BEA0-A43AC0ABF9C7}" type="datetime1">
               <a:rPr lang="en-US" smtClean="0"/>
-              <a:t>2/6/2017</a:t>
+              <a:t>2/9/17</a:t>
             </a:fld>
             <a:endParaRPr lang="en-US" dirty="0"/>
           </a:p>
@@ -7226,7 +7227,7 @@
           <a:p>
             <a:fld id="{B358B9DE-AA25-4E49-889E-1560661006FE}" type="datetime1">
               <a:rPr lang="en-US" smtClean="0"/>
-              <a:t>2/6/2017</a:t>
+              <a:t>2/9/17</a:t>
             </a:fld>
             <a:endParaRPr lang="en-US" dirty="0"/>
           </a:p>
@@ -7403,7 +7404,7 @@
           <a:p>
             <a:fld id="{65377060-0159-45BC-B0E6-7831B822604C}" type="datetime1">
               <a:rPr lang="en-US" smtClean="0"/>
-              <a:t>2/6/2017</a:t>
+              <a:t>2/9/17</a:t>
             </a:fld>
             <a:endParaRPr lang="en-US" dirty="0"/>
           </a:p>
@@ -7590,7 +7591,7 @@
           <a:p>
             <a:fld id="{B8A326F9-FBE3-4A79-8D96-9B4BD2B15395}" type="datetime1">
               <a:rPr lang="en-US" smtClean="0"/>
-              <a:t>2/6/2017</a:t>
+              <a:t>2/9/17</a:t>
             </a:fld>
             <a:endParaRPr lang="en-US" dirty="0"/>
           </a:p>
@@ -8002,7 +8003,7 @@
           <a:p>
             <a:fld id="{B9BA3B1B-C46B-4E8C-A9F9-E842C3B44313}" type="datetime1">
               <a:rPr lang="en-US" smtClean="0"/>
-              <a:t>2/6/2017</a:t>
+              <a:t>2/9/17</a:t>
             </a:fld>
             <a:endParaRPr lang="en-US" dirty="0"/>
           </a:p>
@@ -8241,7 +8242,7 @@
           <a:p>
             <a:fld id="{FD3E73DB-3DF6-47BD-8B30-0F95768420C4}" type="datetime1">
               <a:rPr lang="en-US" smtClean="0"/>
-              <a:t>2/6/2017</a:t>
+              <a:t>2/9/17</a:t>
             </a:fld>
             <a:endParaRPr lang="en-US" dirty="0"/>
           </a:p>
@@ -8629,7 +8630,7 @@
           <a:p>
             <a:fld id="{F3A9562F-A68E-4B00-9D50-3E8641615F9D}" type="datetime1">
               <a:rPr lang="en-US" smtClean="0"/>
-              <a:t>2/6/2017</a:t>
+              <a:t>2/9/17</a:t>
             </a:fld>
             <a:endParaRPr lang="en-US" dirty="0"/>
           </a:p>
@@ -8754,7 +8755,7 @@
           <a:p>
             <a:fld id="{A4BB0AF1-0C67-4013-8775-E69EF57BAAE8}" type="datetime1">
               <a:rPr lang="en-US" smtClean="0"/>
-              <a:t>2/6/2017</a:t>
+              <a:t>2/9/17</a:t>
             </a:fld>
             <a:endParaRPr lang="en-US" dirty="0"/>
           </a:p>
@@ -8856,7 +8857,7 @@
           <a:p>
             <a:fld id="{C8268A36-EDAF-432A-9F3D-A3B671255BDB}" type="datetime1">
               <a:rPr lang="en-US" smtClean="0"/>
-              <a:t>2/6/2017</a:t>
+              <a:t>2/9/17</a:t>
             </a:fld>
             <a:endParaRPr lang="en-US" dirty="0"/>
           </a:p>
@@ -9112,7 +9113,7 @@
           <a:p>
             <a:fld id="{FC2AAFE1-CB09-4710-9912-AA96CD956235}" type="datetime1">
               <a:rPr lang="en-US" smtClean="0"/>
-              <a:t>2/6/2017</a:t>
+              <a:t>2/9/17</a:t>
             </a:fld>
             <a:endParaRPr lang="en-US" dirty="0"/>
           </a:p>
@@ -9399,7 +9400,7 @@
           <a:p>
             <a:fld id="{918FA87B-E856-4D38-8A3B-C06D02968709}" type="datetime1">
               <a:rPr lang="en-US" smtClean="0"/>
-              <a:t>2/6/2017</a:t>
+              <a:t>2/9/17</a:t>
             </a:fld>
             <a:endParaRPr lang="en-US" dirty="0"/>
           </a:p>
@@ -9521,7 +9522,7 @@
           <a:noFill/>
           <a:extLst>
             <a:ext uri="{909E8E84-426E-40dd-AFC4-6F175D3DCCD1}">
-              <a14:hiddenFill xmlns:a14="http://schemas.microsoft.com/office/drawing/2010/main" xmlns="">
+              <a14:hiddenFill xmlns="" xmlns:a14="http://schemas.microsoft.com/office/drawing/2010/main">
                 <a:solidFill>
                   <a:srgbClr val="FFFFFF"/>
                 </a:solidFill>
@@ -9595,7 +9596,7 @@
               </a:ln>
               <a:extLst>
                 <a:ext uri="{91240B29-F687-4f45-9708-019B960494DF}">
-                  <a14:hiddenLine xmlns:a14="http://schemas.microsoft.com/office/drawing/2010/main" xmlns="" w="9525">
+                  <a14:hiddenLine xmlns="" xmlns:a14="http://schemas.microsoft.com/office/drawing/2010/main" w="9525">
                     <a:solidFill>
                       <a:srgbClr val="000000"/>
                     </a:solidFill>
@@ -9685,7 +9686,7 @@
               </a:ln>
               <a:extLst>
                 <a:ext uri="{91240B29-F687-4f45-9708-019B960494DF}">
-                  <a14:hiddenLine xmlns:a14="http://schemas.microsoft.com/office/drawing/2010/main" xmlns="" w="9525">
+                  <a14:hiddenLine xmlns="" xmlns:a14="http://schemas.microsoft.com/office/drawing/2010/main" w="9525">
                     <a:solidFill>
                       <a:srgbClr val="000000"/>
                     </a:solidFill>
@@ -9775,7 +9776,7 @@
               </a:ln>
               <a:extLst>
                 <a:ext uri="{91240B29-F687-4f45-9708-019B960494DF}">
-                  <a14:hiddenLine xmlns:a14="http://schemas.microsoft.com/office/drawing/2010/main" xmlns="" w="9525">
+                  <a14:hiddenLine xmlns="" xmlns:a14="http://schemas.microsoft.com/office/drawing/2010/main" w="9525">
                     <a:solidFill>
                       <a:srgbClr val="000000"/>
                     </a:solidFill>
@@ -9837,7 +9838,7 @@
               </a:ln>
               <a:extLst>
                 <a:ext uri="{91240B29-F687-4f45-9708-019B960494DF}">
-                  <a14:hiddenLine xmlns:a14="http://schemas.microsoft.com/office/drawing/2010/main" xmlns="" w="9525">
+                  <a14:hiddenLine xmlns="" xmlns:a14="http://schemas.microsoft.com/office/drawing/2010/main" w="9525">
                     <a:solidFill>
                       <a:srgbClr val="000000"/>
                     </a:solidFill>
@@ -9927,7 +9928,7 @@
               </a:ln>
               <a:extLst>
                 <a:ext uri="{91240B29-F687-4f45-9708-019B960494DF}">
-                  <a14:hiddenLine xmlns:a14="http://schemas.microsoft.com/office/drawing/2010/main" xmlns="" w="9525">
+                  <a14:hiddenLine xmlns="" xmlns:a14="http://schemas.microsoft.com/office/drawing/2010/main" w="9525">
                     <a:solidFill>
                       <a:srgbClr val="000000"/>
                     </a:solidFill>
@@ -9989,7 +9990,7 @@
               </a:ln>
               <a:extLst>
                 <a:ext uri="{91240B29-F687-4f45-9708-019B960494DF}">
-                  <a14:hiddenLine xmlns:a14="http://schemas.microsoft.com/office/drawing/2010/main" xmlns="" w="9525">
+                  <a14:hiddenLine xmlns="" xmlns:a14="http://schemas.microsoft.com/office/drawing/2010/main" w="9525">
                     <a:solidFill>
                       <a:srgbClr val="000000"/>
                     </a:solidFill>
@@ -10051,7 +10052,7 @@
               </a:ln>
               <a:extLst>
                 <a:ext uri="{91240B29-F687-4f45-9708-019B960494DF}">
-                  <a14:hiddenLine xmlns:a14="http://schemas.microsoft.com/office/drawing/2010/main" xmlns="" w="9525">
+                  <a14:hiddenLine xmlns="" xmlns:a14="http://schemas.microsoft.com/office/drawing/2010/main" w="9525">
                     <a:solidFill>
                       <a:srgbClr val="000000"/>
                     </a:solidFill>
@@ -10141,7 +10142,7 @@
               </a:ln>
               <a:extLst>
                 <a:ext uri="{91240B29-F687-4f45-9708-019B960494DF}">
-                  <a14:hiddenLine xmlns:a14="http://schemas.microsoft.com/office/drawing/2010/main" xmlns="" w="9525">
+                  <a14:hiddenLine xmlns="" xmlns:a14="http://schemas.microsoft.com/office/drawing/2010/main" w="9525">
                     <a:solidFill>
                       <a:srgbClr val="000000"/>
                     </a:solidFill>
@@ -10231,7 +10232,7 @@
               </a:ln>
               <a:extLst>
                 <a:ext uri="{91240B29-F687-4f45-9708-019B960494DF}">
-                  <a14:hiddenLine xmlns:a14="http://schemas.microsoft.com/office/drawing/2010/main" xmlns="" w="9525">
+                  <a14:hiddenLine xmlns="" xmlns:a14="http://schemas.microsoft.com/office/drawing/2010/main" w="9525">
                     <a:solidFill>
                       <a:srgbClr val="000000"/>
                     </a:solidFill>
@@ -10293,7 +10294,7 @@
               </a:ln>
               <a:extLst>
                 <a:ext uri="{91240B29-F687-4f45-9708-019B960494DF}">
-                  <a14:hiddenLine xmlns:a14="http://schemas.microsoft.com/office/drawing/2010/main" xmlns="" w="9525">
+                  <a14:hiddenLine xmlns="" xmlns:a14="http://schemas.microsoft.com/office/drawing/2010/main" w="9525">
                     <a:solidFill>
                       <a:srgbClr val="000000"/>
                     </a:solidFill>
@@ -10403,7 +10404,7 @@
               </a:ln>
               <a:extLst>
                 <a:ext uri="{91240B29-F687-4f45-9708-019B960494DF}">
-                  <a14:hiddenLine xmlns:a14="http://schemas.microsoft.com/office/drawing/2010/main" xmlns="" w="9525">
+                  <a14:hiddenLine xmlns="" xmlns:a14="http://schemas.microsoft.com/office/drawing/2010/main" w="9525">
                     <a:solidFill>
                       <a:srgbClr val="000000"/>
                     </a:solidFill>
@@ -10487,7 +10488,7 @@
               </a:ln>
               <a:extLst>
                 <a:ext uri="{91240B29-F687-4f45-9708-019B960494DF}">
-                  <a14:hiddenLine xmlns:a14="http://schemas.microsoft.com/office/drawing/2010/main" xmlns="" w="9525">
+                  <a14:hiddenLine xmlns="" xmlns:a14="http://schemas.microsoft.com/office/drawing/2010/main" w="9525">
                     <a:solidFill>
                       <a:srgbClr val="000000"/>
                     </a:solidFill>
@@ -10549,7 +10550,7 @@
               </a:ln>
               <a:extLst>
                 <a:ext uri="{91240B29-F687-4f45-9708-019B960494DF}">
-                  <a14:hiddenLine xmlns:a14="http://schemas.microsoft.com/office/drawing/2010/main" xmlns="" w="9525">
+                  <a14:hiddenLine xmlns="" xmlns:a14="http://schemas.microsoft.com/office/drawing/2010/main" w="9525">
                     <a:solidFill>
                       <a:srgbClr val="000000"/>
                     </a:solidFill>
@@ -10611,7 +10612,7 @@
               </a:ln>
               <a:extLst>
                 <a:ext uri="{91240B29-F687-4f45-9708-019B960494DF}">
-                  <a14:hiddenLine xmlns:a14="http://schemas.microsoft.com/office/drawing/2010/main" xmlns="" w="9525">
+                  <a14:hiddenLine xmlns="" xmlns:a14="http://schemas.microsoft.com/office/drawing/2010/main" w="9525">
                     <a:solidFill>
                       <a:srgbClr val="000000"/>
                     </a:solidFill>
@@ -10701,7 +10702,7 @@
               </a:ln>
               <a:extLst>
                 <a:ext uri="{91240B29-F687-4f45-9708-019B960494DF}">
-                  <a14:hiddenLine xmlns:a14="http://schemas.microsoft.com/office/drawing/2010/main" xmlns="" w="9525">
+                  <a14:hiddenLine xmlns="" xmlns:a14="http://schemas.microsoft.com/office/drawing/2010/main" w="9525">
                     <a:solidFill>
                       <a:srgbClr val="000000"/>
                     </a:solidFill>
@@ -10735,7 +10736,7 @@
               </a:ln>
               <a:extLst>
                 <a:ext uri="{91240B29-F687-4f45-9708-019B960494DF}">
-                  <a14:hiddenLine xmlns:a14="http://schemas.microsoft.com/office/drawing/2010/main" xmlns="" w="9525">
+                  <a14:hiddenLine xmlns="" xmlns:a14="http://schemas.microsoft.com/office/drawing/2010/main" w="9525">
                     <a:solidFill>
                       <a:srgbClr val="000000"/>
                     </a:solidFill>
@@ -10800,7 +10801,7 @@
               </a:ln>
               <a:extLst>
                 <a:ext uri="{91240B29-F687-4f45-9708-019B960494DF}">
-                  <a14:hiddenLine xmlns:a14="http://schemas.microsoft.com/office/drawing/2010/main" xmlns="" w="9525">
+                  <a14:hiddenLine xmlns="" xmlns:a14="http://schemas.microsoft.com/office/drawing/2010/main" w="9525">
                     <a:solidFill>
                       <a:srgbClr val="000000"/>
                     </a:solidFill>
@@ -10890,7 +10891,7 @@
               </a:ln>
               <a:extLst>
                 <a:ext uri="{91240B29-F687-4f45-9708-019B960494DF}">
-                  <a14:hiddenLine xmlns:a14="http://schemas.microsoft.com/office/drawing/2010/main" xmlns="" w="9525">
+                  <a14:hiddenLine xmlns="" xmlns:a14="http://schemas.microsoft.com/office/drawing/2010/main" w="9525">
                     <a:solidFill>
                       <a:srgbClr val="000000"/>
                     </a:solidFill>
@@ -10952,7 +10953,7 @@
               </a:ln>
               <a:extLst>
                 <a:ext uri="{91240B29-F687-4f45-9708-019B960494DF}">
-                  <a14:hiddenLine xmlns:a14="http://schemas.microsoft.com/office/drawing/2010/main" xmlns="" w="9525">
+                  <a14:hiddenLine xmlns="" xmlns:a14="http://schemas.microsoft.com/office/drawing/2010/main" w="9525">
                     <a:solidFill>
                       <a:srgbClr val="000000"/>
                     </a:solidFill>
@@ -11042,7 +11043,7 @@
               </a:ln>
               <a:extLst>
                 <a:ext uri="{91240B29-F687-4f45-9708-019B960494DF}">
-                  <a14:hiddenLine xmlns:a14="http://schemas.microsoft.com/office/drawing/2010/main" xmlns="" w="9525">
+                  <a14:hiddenLine xmlns="" xmlns:a14="http://schemas.microsoft.com/office/drawing/2010/main" w="9525">
                     <a:solidFill>
                       <a:srgbClr val="000000"/>
                     </a:solidFill>
@@ -11107,7 +11108,7 @@
               </a:ln>
               <a:extLst>
                 <a:ext uri="{91240B29-F687-4f45-9708-019B960494DF}">
-                  <a14:hiddenLine xmlns:a14="http://schemas.microsoft.com/office/drawing/2010/main" xmlns="" w="9525">
+                  <a14:hiddenLine xmlns="" xmlns:a14="http://schemas.microsoft.com/office/drawing/2010/main" w="9525">
                     <a:solidFill>
                       <a:srgbClr val="000000"/>
                     </a:solidFill>
@@ -11169,7 +11170,7 @@
               </a:ln>
               <a:extLst>
                 <a:ext uri="{91240B29-F687-4f45-9708-019B960494DF}">
-                  <a14:hiddenLine xmlns:a14="http://schemas.microsoft.com/office/drawing/2010/main" xmlns="" w="9525">
+                  <a14:hiddenLine xmlns="" xmlns:a14="http://schemas.microsoft.com/office/drawing/2010/main" w="9525">
                     <a:solidFill>
                       <a:srgbClr val="000000"/>
                     </a:solidFill>
@@ -11259,7 +11260,7 @@
               </a:ln>
               <a:extLst>
                 <a:ext uri="{91240B29-F687-4f45-9708-019B960494DF}">
-                  <a14:hiddenLine xmlns:a14="http://schemas.microsoft.com/office/drawing/2010/main" xmlns="" w="9525">
+                  <a14:hiddenLine xmlns="" xmlns:a14="http://schemas.microsoft.com/office/drawing/2010/main" w="9525">
                     <a:solidFill>
                       <a:srgbClr val="000000"/>
                     </a:solidFill>
@@ -11349,7 +11350,7 @@
               </a:ln>
               <a:extLst>
                 <a:ext uri="{91240B29-F687-4f45-9708-019B960494DF}">
-                  <a14:hiddenLine xmlns:a14="http://schemas.microsoft.com/office/drawing/2010/main" xmlns="" w="9525">
+                  <a14:hiddenLine xmlns="" xmlns:a14="http://schemas.microsoft.com/office/drawing/2010/main" w="9525">
                     <a:solidFill>
                       <a:srgbClr val="000000"/>
                     </a:solidFill>
@@ -11414,7 +11415,7 @@
               </a:ln>
               <a:extLst>
                 <a:ext uri="{91240B29-F687-4f45-9708-019B960494DF}">
-                  <a14:hiddenLine xmlns:a14="http://schemas.microsoft.com/office/drawing/2010/main" xmlns="" w="9525">
+                  <a14:hiddenLine xmlns="" xmlns:a14="http://schemas.microsoft.com/office/drawing/2010/main" w="9525">
                     <a:solidFill>
                       <a:srgbClr val="000000"/>
                     </a:solidFill>
@@ -11534,7 +11535,7 @@
               </a:ln>
               <a:extLst>
                 <a:ext uri="{91240B29-F687-4f45-9708-019B960494DF}">
-                  <a14:hiddenLine xmlns:a14="http://schemas.microsoft.com/office/drawing/2010/main" xmlns="" w="9525">
+                  <a14:hiddenLine xmlns="" xmlns:a14="http://schemas.microsoft.com/office/drawing/2010/main" w="9525">
                     <a:solidFill>
                       <a:srgbClr val="000000"/>
                     </a:solidFill>
@@ -11615,7 +11616,7 @@
               </a:ln>
               <a:extLst>
                 <a:ext uri="{91240B29-F687-4f45-9708-019B960494DF}">
-                  <a14:hiddenLine xmlns:a14="http://schemas.microsoft.com/office/drawing/2010/main" xmlns="" w="9525">
+                  <a14:hiddenLine xmlns="" xmlns:a14="http://schemas.microsoft.com/office/drawing/2010/main" w="9525">
                     <a:solidFill>
                       <a:srgbClr val="000000"/>
                     </a:solidFill>
@@ -11730,7 +11731,7 @@
               </a:ln>
               <a:extLst>
                 <a:ext uri="{91240B29-F687-4f45-9708-019B960494DF}">
-                  <a14:hiddenLine xmlns:a14="http://schemas.microsoft.com/office/drawing/2010/main" xmlns="" w="9525">
+                  <a14:hiddenLine xmlns="" xmlns:a14="http://schemas.microsoft.com/office/drawing/2010/main" w="9525">
                     <a:solidFill>
                       <a:srgbClr val="000000"/>
                     </a:solidFill>
@@ -11820,7 +11821,7 @@
               </a:ln>
               <a:extLst>
                 <a:ext uri="{91240B29-F687-4f45-9708-019B960494DF}">
-                  <a14:hiddenLine xmlns:a14="http://schemas.microsoft.com/office/drawing/2010/main" xmlns="" w="9525">
+                  <a14:hiddenLine xmlns="" xmlns:a14="http://schemas.microsoft.com/office/drawing/2010/main" w="9525">
                     <a:solidFill>
                       <a:srgbClr val="000000"/>
                     </a:solidFill>
@@ -11885,7 +11886,7 @@
               </a:ln>
               <a:extLst>
                 <a:ext uri="{91240B29-F687-4f45-9708-019B960494DF}">
-                  <a14:hiddenLine xmlns:a14="http://schemas.microsoft.com/office/drawing/2010/main" xmlns="" w="9525">
+                  <a14:hiddenLine xmlns="" xmlns:a14="http://schemas.microsoft.com/office/drawing/2010/main" w="9525">
                     <a:solidFill>
                       <a:srgbClr val="000000"/>
                     </a:solidFill>
@@ -11975,7 +11976,7 @@
               </a:ln>
               <a:extLst>
                 <a:ext uri="{91240B29-F687-4f45-9708-019B960494DF}">
-                  <a14:hiddenLine xmlns:a14="http://schemas.microsoft.com/office/drawing/2010/main" xmlns="" w="9525">
+                  <a14:hiddenLine xmlns="" xmlns:a14="http://schemas.microsoft.com/office/drawing/2010/main" w="9525">
                     <a:solidFill>
                       <a:srgbClr val="000000"/>
                     </a:solidFill>
@@ -12043,7 +12044,7 @@
               </a:ln>
               <a:extLst>
                 <a:ext uri="{91240B29-F687-4f45-9708-019B960494DF}">
-                  <a14:hiddenLine xmlns:a14="http://schemas.microsoft.com/office/drawing/2010/main" xmlns="" w="9525">
+                  <a14:hiddenLine xmlns="" xmlns:a14="http://schemas.microsoft.com/office/drawing/2010/main" w="9525">
                     <a:solidFill>
                       <a:srgbClr val="000000"/>
                     </a:solidFill>
@@ -12133,7 +12134,7 @@
               </a:ln>
               <a:extLst>
                 <a:ext uri="{91240B29-F687-4f45-9708-019B960494DF}">
-                  <a14:hiddenLine xmlns:a14="http://schemas.microsoft.com/office/drawing/2010/main" xmlns="" w="9525">
+                  <a14:hiddenLine xmlns="" xmlns:a14="http://schemas.microsoft.com/office/drawing/2010/main" w="9525">
                     <a:solidFill>
                       <a:srgbClr val="000000"/>
                     </a:solidFill>
@@ -12201,7 +12202,7 @@
               </a:ln>
               <a:extLst>
                 <a:ext uri="{91240B29-F687-4f45-9708-019B960494DF}">
-                  <a14:hiddenLine xmlns:a14="http://schemas.microsoft.com/office/drawing/2010/main" xmlns="" w="9525">
+                  <a14:hiddenLine xmlns="" xmlns:a14="http://schemas.microsoft.com/office/drawing/2010/main" w="9525">
                     <a:solidFill>
                       <a:srgbClr val="000000"/>
                     </a:solidFill>
@@ -12291,7 +12292,7 @@
               </a:ln>
               <a:extLst>
                 <a:ext uri="{91240B29-F687-4f45-9708-019B960494DF}">
-                  <a14:hiddenLine xmlns:a14="http://schemas.microsoft.com/office/drawing/2010/main" xmlns="" w="9525">
+                  <a14:hiddenLine xmlns="" xmlns:a14="http://schemas.microsoft.com/office/drawing/2010/main" w="9525">
                     <a:solidFill>
                       <a:srgbClr val="000000"/>
                     </a:solidFill>
@@ -12325,7 +12326,7 @@
               </a:ln>
               <a:extLst>
                 <a:ext uri="{91240B29-F687-4f45-9708-019B960494DF}">
-                  <a14:hiddenLine xmlns:a14="http://schemas.microsoft.com/office/drawing/2010/main" xmlns="" w="9525">
+                  <a14:hiddenLine xmlns="" xmlns:a14="http://schemas.microsoft.com/office/drawing/2010/main" w="9525">
                     <a:solidFill>
                       <a:srgbClr val="000000"/>
                     </a:solidFill>
@@ -12970,6 +12971,136 @@
           <a:p>
             <a:pPr algn="ctr"/>
             <a:r>
+              <a:rPr lang="en-US" dirty="0" smtClean="0"/>
+              <a:t>Facebook’s Response</a:t>
+            </a:r>
+            <a:endParaRPr lang="en-US" dirty="0"/>
+          </a:p>
+        </p:txBody>
+      </p:sp>
+      <p:sp>
+        <p:nvSpPr>
+          <p:cNvPr id="4" name="Footer Placeholder 3"/>
+          <p:cNvSpPr>
+            <a:spLocks noGrp="1"/>
+          </p:cNvSpPr>
+          <p:nvPr>
+            <p:ph type="ftr" sz="quarter" idx="11"/>
+          </p:nvPr>
+        </p:nvSpPr>
+        <p:spPr/>
+        <p:txBody>
+          <a:bodyPr/>
+          <a:lstStyle/>
+          <a:p>
+            <a:r>
+              <a:rPr lang="en-US" smtClean="0"/>
+              <a:t>Matt Langlois |</a:t>
+            </a:r>
+            <a:endParaRPr lang="en-US" dirty="0"/>
+          </a:p>
+        </p:txBody>
+      </p:sp>
+      <p:sp>
+        <p:nvSpPr>
+          <p:cNvPr id="5" name="Slide Number Placeholder 4"/>
+          <p:cNvSpPr>
+            <a:spLocks noGrp="1"/>
+          </p:cNvSpPr>
+          <p:nvPr>
+            <p:ph type="sldNum" sz="quarter" idx="12"/>
+          </p:nvPr>
+        </p:nvSpPr>
+        <p:spPr/>
+        <p:txBody>
+          <a:bodyPr/>
+          <a:lstStyle/>
+          <a:p>
+            <a:fld id="{6D22F896-40B5-4ADD-8801-0D06FADFA095}" type="slidenum">
+              <a:rPr lang="en-US" smtClean="0"/>
+              <a:t>10</a:t>
+            </a:fld>
+            <a:endParaRPr lang="en-US" dirty="0"/>
+          </a:p>
+        </p:txBody>
+      </p:sp>
+      <p:pic>
+        <p:nvPicPr>
+          <p:cNvPr id="6" name="Picture 5"/>
+          <p:cNvPicPr>
+            <a:picLocks noChangeAspect="1"/>
+          </p:cNvPicPr>
+          <p:nvPr/>
+        </p:nvPicPr>
+        <p:blipFill>
+          <a:blip r:embed="rId2">
+            <a:extLst>
+              <a:ext uri="{28A0092B-C50C-407E-A947-70E740481C1C}">
+                <a14:useLocalDpi xmlns:a14="http://schemas.microsoft.com/office/drawing/2010/main" val="0"/>
+              </a:ext>
+            </a:extLst>
+          </a:blip>
+          <a:stretch>
+            <a:fillRect/>
+          </a:stretch>
+        </p:blipFill>
+        <p:spPr>
+          <a:xfrm>
+            <a:off x="2371776" y="1691721"/>
+            <a:ext cx="7600674" cy="4477546"/>
+          </a:xfrm>
+          <a:prstGeom prst="rect">
+            <a:avLst/>
+          </a:prstGeom>
+        </p:spPr>
+      </p:pic>
+    </p:spTree>
+    <p:extLst>
+      <p:ext uri="{BB962C8B-B14F-4D97-AF65-F5344CB8AC3E}">
+        <p14:creationId xmlns:p14="http://schemas.microsoft.com/office/powerpoint/2010/main" val="969789859"/>
+      </p:ext>
+    </p:extLst>
+  </p:cSld>
+  <p:clrMapOvr>
+    <a:masterClrMapping/>
+  </p:clrMapOvr>
+</p:sld>
+</file>
+
+<file path=ppt/slides/slide11.xml><?xml version="1.0" encoding="utf-8"?>
+<p:sld xmlns:a="http://schemas.openxmlformats.org/drawingml/2006/main" xmlns:r="http://schemas.openxmlformats.org/officeDocument/2006/relationships" xmlns:p="http://schemas.openxmlformats.org/presentationml/2006/main">
+  <p:cSld>
+    <p:spTree>
+      <p:nvGrpSpPr>
+        <p:cNvPr id="1" name=""/>
+        <p:cNvGrpSpPr/>
+        <p:nvPr/>
+      </p:nvGrpSpPr>
+      <p:grpSpPr>
+        <a:xfrm>
+          <a:off x="0" y="0"/>
+          <a:ext cx="0" cy="0"/>
+          <a:chOff x="0" y="0"/>
+          <a:chExt cx="0" cy="0"/>
+        </a:xfrm>
+      </p:grpSpPr>
+      <p:sp>
+        <p:nvSpPr>
+          <p:cNvPr id="2" name="Title 1"/>
+          <p:cNvSpPr>
+            <a:spLocks noGrp="1"/>
+          </p:cNvSpPr>
+          <p:nvPr>
+            <p:ph type="title"/>
+          </p:nvPr>
+        </p:nvSpPr>
+        <p:spPr/>
+        <p:txBody>
+          <a:bodyPr/>
+          <a:lstStyle/>
+          <a:p>
+            <a:pPr algn="ctr"/>
+            <a:r>
               <a:rPr lang="en-US" dirty="0"/>
               <a:t>Keep in touch!</a:t>
             </a:r>
@@ -13105,7 +13236,7 @@
           <a:p>
             <a:fld id="{6D22F896-40B5-4ADD-8801-0D06FADFA095}" type="slidenum">
               <a:rPr lang="en-US" smtClean="0"/>
-              <a:t>10</a:t>
+              <a:t>11</a:t>
             </a:fld>
             <a:endParaRPr lang="en-US" dirty="0"/>
           </a:p>
@@ -14184,8 +14315,8 @@
         </p:blipFill>
         <p:spPr>
           <a:xfrm>
-            <a:off x="3689013" y="3427182"/>
-            <a:ext cx="4810796" cy="257211"/>
+            <a:off x="3549129" y="3412064"/>
+            <a:ext cx="5093576" cy="272329"/>
           </a:xfrm>
           <a:prstGeom prst="rect">
             <a:avLst/>
@@ -14458,8 +14589,45 @@
               <a:buNone/>
             </a:pPr>
             <a:r>
+              <a:rPr lang="en-US" dirty="0" smtClean="0"/>
+              <a:t>Demo of a </a:t>
+            </a:r>
+            <a:r>
+              <a:rPr lang="en-US" dirty="0" err="1" smtClean="0"/>
+              <a:t>facebook</a:t>
+            </a:r>
+            <a:r>
+              <a:rPr lang="en-US" dirty="0" smtClean="0"/>
+              <a:t> vulnerability I found while building this talk</a:t>
+            </a:r>
+            <a:r>
+              <a:rPr lang="mr-IN" dirty="0" smtClean="0"/>
+              <a:t>…</a:t>
+            </a:r>
+            <a:r>
+              <a:rPr lang="en-US" dirty="0" smtClean="0"/>
+              <a:t> The issue has been reported to </a:t>
+            </a:r>
+            <a:r>
+              <a:rPr lang="en-US" dirty="0" err="1" smtClean="0"/>
+              <a:t>facebook</a:t>
+            </a:r>
+            <a:r>
+              <a:rPr lang="en-US" dirty="0" smtClean="0"/>
+              <a:t> by me and I have permission to demo this</a:t>
+            </a:r>
+          </a:p>
+          <a:p>
+            <a:pPr marL="0" indent="0">
+              <a:buNone/>
+            </a:pPr>
+            <a:r>
+              <a:rPr lang="en-US" dirty="0" smtClean="0"/>
+              <a:t>Please </a:t>
+            </a:r>
+            <a:r>
               <a:rPr lang="en-US" dirty="0"/>
-              <a:t>Please let me steal your </a:t>
+              <a:t>let me steal your </a:t>
             </a:r>
             <a:r>
               <a:rPr lang="en-US" dirty="0" err="1"/>
@@ -14478,34 +14646,15 @@
               <a:rPr lang="en-US" sz="4000" dirty="0">
                 <a:hlinkClick r:id="rId2"/>
               </a:rPr>
-              <a:t>https://shorten.ninja/clickjacking</a:t>
+              <a:t>https://</a:t>
+            </a:r>
+            <a:r>
+              <a:rPr lang="en-US" sz="4000" dirty="0" smtClean="0">
+                <a:hlinkClick r:id="rId2"/>
+              </a:rPr>
+              <a:t>shorten.ninja/clickjacking</a:t>
             </a:r>
             <a:endParaRPr lang="en-US" sz="4000" dirty="0"/>
-          </a:p>
-          <a:p>
-            <a:pPr marL="0" indent="0">
-              <a:buNone/>
-            </a:pPr>
-            <a:r>
-              <a:rPr lang="en-US" dirty="0"/>
-              <a:t>It probably only works in chrome… also it requires you to be logged into </a:t>
-            </a:r>
-            <a:r>
-              <a:rPr lang="en-US" dirty="0" err="1"/>
-              <a:t>facebook</a:t>
-            </a:r>
-            <a:r>
-              <a:rPr lang="en-US" dirty="0"/>
-              <a:t>.. My demo/</a:t>
-            </a:r>
-            <a:r>
-              <a:rPr lang="en-US" dirty="0" err="1"/>
-              <a:t>PoC</a:t>
-            </a:r>
-            <a:r>
-              <a:rPr lang="en-US" dirty="0"/>
-              <a:t> isn’t perfect but a real hacker’s would be</a:t>
-            </a:r>
           </a:p>
         </p:txBody>
       </p:sp>

</xml_diff>